<commit_message>
Correção e atualização de documento
Foi realizado alterações ortograficas e atualização no campo erro.
</commit_message>
<xml_diff>
--- a/CT-Apresentacao/Apresentacao.pptx
+++ b/CT-Apresentacao/Apresentacao.pptx
@@ -6315,7 +6315,15 @@
             </a:pPr>
             <a:r>
               <a:rPr lang="pt-BR" b="1" dirty="0"/>
-              <a:t>Teste de Configuração de Software</a:t>
+              <a:t>Teste </a:t>
+            </a:r>
+            <a:r>
+              <a:rPr lang="pt-BR" b="1" dirty="0" smtClean="0"/>
+              <a:t>e </a:t>
+            </a:r>
+            <a:r>
+              <a:rPr lang="pt-BR" b="1" dirty="0"/>
+              <a:t>Configuração de Software</a:t>
             </a:r>
           </a:p>
         </p:txBody>
@@ -6547,7 +6555,7 @@
         </p:nvSpPr>
         <p:spPr>
           <a:xfrm>
-            <a:off x="1208088" y="3341688"/>
+            <a:off x="1208088" y="3224458"/>
             <a:ext cx="10058400" cy="1171575"/>
           </a:xfrm>
           <a:prstGeom prst="rect">
@@ -6817,11 +6825,18 @@
               <a:t>Adriano </a:t>
             </a:r>
             <a:r>
+              <a:rPr lang="pt-BR" b="1" cap="none" dirty="0" err="1">
+                <a:latin typeface="Arial" panose="020B0604020202020204" pitchFamily="34" charset="0"/>
+                <a:cs typeface="Arial" panose="020B0604020202020204" pitchFamily="34" charset="0"/>
+              </a:rPr>
+              <a:t>V</a:t>
+            </a:r>
+            <a:r>
               <a:rPr lang="pt-BR" b="1" cap="none" dirty="0" err="1" smtClean="0">
                 <a:latin typeface="Arial" panose="020B0604020202020204" pitchFamily="34" charset="0"/>
                 <a:cs typeface="Arial" panose="020B0604020202020204" pitchFamily="34" charset="0"/>
               </a:rPr>
-              <a:t>vasconcélos</a:t>
+              <a:t>asconcélos</a:t>
             </a:r>
             <a:endParaRPr lang="pt-BR" b="1" cap="none" dirty="0" smtClean="0">
               <a:latin typeface="Arial" panose="020B0604020202020204" pitchFamily="34" charset="0"/>
@@ -6854,11 +6869,18 @@
               <a:t> </a:t>
             </a:r>
             <a:r>
-              <a:rPr lang="pt-BR" b="1" cap="none" dirty="0" err="1" smtClean="0">
+              <a:rPr lang="pt-BR" b="1" cap="none" dirty="0">
                 <a:latin typeface="Arial" panose="020B0604020202020204" pitchFamily="34" charset="0"/>
                 <a:cs typeface="Arial" panose="020B0604020202020204" pitchFamily="34" charset="0"/>
               </a:rPr>
-              <a:t>souza</a:t>
+              <a:t>S</a:t>
+            </a:r>
+            <a:r>
+              <a:rPr lang="pt-BR" b="1" cap="none" dirty="0" smtClean="0">
+                <a:latin typeface="Arial" panose="020B0604020202020204" pitchFamily="34" charset="0"/>
+                <a:cs typeface="Arial" panose="020B0604020202020204" pitchFamily="34" charset="0"/>
+              </a:rPr>
+              <a:t>ouza</a:t>
             </a:r>
             <a:endParaRPr lang="pt-BR" b="1" cap="none" dirty="0" smtClean="0">
               <a:latin typeface="Arial" panose="020B0604020202020204" pitchFamily="34" charset="0"/>
@@ -6877,11 +6899,11 @@
               <a:t>           Richardson </a:t>
             </a:r>
             <a:r>
-              <a:rPr lang="pt-BR" b="1" cap="none" dirty="0" err="1" smtClean="0">
+              <a:rPr lang="pt-BR" b="1" cap="none" dirty="0" smtClean="0">
                 <a:latin typeface="Arial" panose="020B0604020202020204" pitchFamily="34" charset="0"/>
                 <a:cs typeface="Arial" panose="020B0604020202020204" pitchFamily="34" charset="0"/>
               </a:rPr>
-              <a:t>tibúrcio</a:t>
+              <a:t>Tibúrcio</a:t>
             </a:r>
             <a:endParaRPr lang="pt-BR" cap="none" dirty="0" smtClean="0"/>
           </a:p>
@@ -7387,8 +7409,8 @@
         </p:blipFill>
         <p:spPr bwMode="auto">
           <a:xfrm>
-            <a:off x="6811110" y="3159368"/>
-            <a:ext cx="1395043" cy="773724"/>
+            <a:off x="6811110" y="3159367"/>
+            <a:ext cx="2060858" cy="1143001"/>
           </a:xfrm>
           <a:prstGeom prst="rect">
             <a:avLst/>
@@ -7439,8 +7461,8 @@
         </p:blipFill>
         <p:spPr bwMode="auto">
           <a:xfrm>
-            <a:off x="9595797" y="3446583"/>
-            <a:ext cx="1928384" cy="973017"/>
+            <a:off x="9026577" y="3159369"/>
+            <a:ext cx="2497604" cy="1260232"/>
           </a:xfrm>
           <a:prstGeom prst="rect">
             <a:avLst/>
@@ -9081,8 +9103,13 @@
             </a:r>
             <a:r>
               <a:rPr lang="pt-BR" dirty="0"/>
-              <a:t>de unidade, </a:t>
-            </a:r>
+              <a:t>de </a:t>
+            </a:r>
+            <a:r>
+              <a:rPr lang="pt-BR" dirty="0" smtClean="0"/>
+              <a:t>unidade </a:t>
+            </a:r>
+            <a:endParaRPr lang="pt-BR" dirty="0"/>
           </a:p>
           <a:p>
             <a:pPr marL="285750" indent="-285750">
@@ -9794,25 +9821,6 @@
               </a:spcAft>
               <a:defRPr/>
             </a:pPr>
-            <a:endParaRPr lang="pt-BR"/>
-          </a:p>
-        </p:txBody>
-      </p:sp>
-      <p:sp>
-        <p:nvSpPr>
-          <p:cNvPr id="4" name="Subtítulo 3"/>
-          <p:cNvSpPr>
-            <a:spLocks noGrp="1"/>
-          </p:cNvSpPr>
-          <p:nvPr>
-            <p:ph type="subTitle" idx="1"/>
-          </p:nvPr>
-        </p:nvSpPr>
-        <p:spPr/>
-        <p:txBody>
-          <a:bodyPr/>
-          <a:lstStyle/>
-          <a:p>
             <a:endParaRPr lang="pt-BR"/>
           </a:p>
         </p:txBody>
@@ -9945,33 +9953,6 @@
               <a:t>Plano de Teste</a:t>
             </a:r>
             <a:endParaRPr lang="pt-BR" dirty="0"/>
-          </a:p>
-        </p:txBody>
-      </p:sp>
-      <p:sp>
-        <p:nvSpPr>
-          <p:cNvPr id="3" name="Subtítulo 2"/>
-          <p:cNvSpPr>
-            <a:spLocks noGrp="1"/>
-          </p:cNvSpPr>
-          <p:nvPr>
-            <p:ph type="subTitle" idx="1"/>
-          </p:nvPr>
-        </p:nvSpPr>
-        <p:spPr>
-          <a:xfrm>
-            <a:off x="1208088" y="3189288"/>
-            <a:ext cx="10058400" cy="960437"/>
-          </a:xfrm>
-        </p:spPr>
-        <p:txBody>
-          <a:bodyPr rtlCol="0"/>
-          <a:lstStyle/>
-          <a:p>
-            <a:pPr fontAlgn="auto">
-              <a:defRPr/>
-            </a:pPr>
-            <a:endParaRPr lang="pt-BR" dirty="0" smtClean="0"/>
           </a:p>
         </p:txBody>
       </p:sp>
@@ -14932,10 +14913,16 @@
           <a:lstStyle/>
           <a:p>
             <a:r>
+              <a:rPr lang="pt-BR" dirty="0" smtClean="0">
+                <a:latin typeface="Calibri" pitchFamily="34" charset="0"/>
+              </a:rPr>
+              <a:t>O </a:t>
+            </a:r>
+            <a:r>
               <a:rPr lang="pt-BR" dirty="0">
                 <a:latin typeface="Calibri" pitchFamily="34" charset="0"/>
               </a:rPr>
-              <a:t>O desempenho da equipe de desenvolvimento </a:t>
+              <a:t>desempenho da equipe de desenvolvimento </a:t>
             </a:r>
             <a:r>
               <a:rPr lang="pt-BR" dirty="0" smtClean="0">
@@ -15272,7 +15259,7 @@
   <a:extraClrSchemeLst/>
   <a:extLst>
     <a:ext uri="{05A4C25C-085E-4340-85A3-A5531E510DB2}">
-      <thm15:themeFamily xmlns="" xmlns:thm15="http://schemas.microsoft.com/office/thememl/2012/main" name="Retrospect" id="{5F128B03-DCCA-4EEB-AB3B-CF2899314A46}" vid="{D26EA377-59BD-4C9C-9D94-EE8416EE4C79}"/>
+      <thm15:themeFamily xmlns:thm15="http://schemas.microsoft.com/office/thememl/2012/main" xmlns="" name="Retrospect" id="{5F128B03-DCCA-4EEB-AB3B-CF2899314A46}" vid="{D26EA377-59BD-4C9C-9D94-EE8416EE4C79}"/>
     </a:ext>
   </a:extLst>
 </a:theme>
@@ -15533,7 +15520,7 @@
   <a:extraClrSchemeLst/>
   <a:extLst>
     <a:ext uri="{05A4C25C-085E-4340-85A3-A5531E510DB2}">
-      <thm15:themeFamily xmlns="" xmlns:thm15="http://schemas.microsoft.com/office/thememl/2012/main" name="Office Theme" id="{62F939B6-93AF-4DB8-9C6B-D6C7DFDC589F}" vid="{4A3C46E8-61CC-4603-A589-7422A47A8E4A}"/>
+      <thm15:themeFamily xmlns:thm15="http://schemas.microsoft.com/office/thememl/2012/main" xmlns="" name="Office Theme" id="{62F939B6-93AF-4DB8-9C6B-D6C7DFDC589F}" vid="{4A3C46E8-61CC-4603-A589-7422A47A8E4A}"/>
     </a:ext>
   </a:extLst>
 </a:theme>

</xml_diff>

<commit_message>
Atualização de casos de erro
Descrição dos testes feitos.
</commit_message>
<xml_diff>
--- a/CT-Apresentacao/Apresentacao.pptx
+++ b/CT-Apresentacao/Apresentacao.pptx
@@ -259,7 +259,7 @@
               <a:pPr>
                 <a:defRPr/>
               </a:pPr>
-              <a:t>03/06/2015</a:t>
+              <a:t>04/06/2015</a:t>
             </a:fld>
             <a:endParaRPr lang="pt-BR" dirty="0"/>
           </a:p>
@@ -2443,7 +2443,7 @@
               <a:pPr>
                 <a:defRPr/>
               </a:pPr>
-              <a:t>03/06/2015</a:t>
+              <a:t>04/06/2015</a:t>
             </a:fld>
             <a:endParaRPr lang="pt-BR" dirty="0"/>
           </a:p>
@@ -2638,7 +2638,7 @@
               <a:pPr>
                 <a:defRPr/>
               </a:pPr>
-              <a:t>03/06/2015</a:t>
+              <a:t>04/06/2015</a:t>
             </a:fld>
             <a:endParaRPr lang="pt-BR" dirty="0"/>
           </a:p>
@@ -2919,7 +2919,7 @@
               <a:pPr>
                 <a:defRPr/>
               </a:pPr>
-              <a:t>03/06/2015</a:t>
+              <a:t>04/06/2015</a:t>
             </a:fld>
             <a:endParaRPr lang="pt-BR" dirty="0"/>
           </a:p>
@@ -3120,7 +3120,7 @@
               <a:pPr>
                 <a:defRPr/>
               </a:pPr>
-              <a:t>03/06/2015</a:t>
+              <a:t>04/06/2015</a:t>
             </a:fld>
             <a:endParaRPr lang="pt-BR" dirty="0"/>
           </a:p>
@@ -3524,7 +3524,7 @@
               <a:pPr>
                 <a:defRPr/>
               </a:pPr>
-              <a:t>03/06/2015</a:t>
+              <a:t>04/06/2015</a:t>
             </a:fld>
             <a:endParaRPr lang="pt-BR" dirty="0"/>
           </a:p>
@@ -3786,7 +3786,7 @@
               <a:pPr>
                 <a:defRPr/>
               </a:pPr>
-              <a:t>03/06/2015</a:t>
+              <a:t>04/06/2015</a:t>
             </a:fld>
             <a:endParaRPr lang="pt-BR" dirty="0"/>
           </a:p>
@@ -4190,7 +4190,7 @@
               <a:pPr>
                 <a:defRPr/>
               </a:pPr>
-              <a:t>03/06/2015</a:t>
+              <a:t>04/06/2015</a:t>
             </a:fld>
             <a:endParaRPr lang="pt-BR" dirty="0"/>
           </a:p>
@@ -4333,7 +4333,7 @@
               <a:pPr>
                 <a:defRPr/>
               </a:pPr>
-              <a:t>03/06/2015</a:t>
+              <a:t>04/06/2015</a:t>
             </a:fld>
             <a:endParaRPr lang="pt-BR" dirty="0"/>
           </a:p>
@@ -4529,7 +4529,7 @@
               <a:pPr>
                 <a:defRPr/>
               </a:pPr>
-              <a:t>03/06/2015</a:t>
+              <a:t>04/06/2015</a:t>
             </a:fld>
             <a:endParaRPr lang="pt-BR" dirty="0"/>
           </a:p>
@@ -4898,7 +4898,7 @@
               <a:pPr>
                 <a:defRPr/>
               </a:pPr>
-              <a:t>03/06/2015</a:t>
+              <a:t>04/06/2015</a:t>
             </a:fld>
             <a:endParaRPr lang="pt-BR" dirty="0"/>
           </a:p>
@@ -5295,7 +5295,7 @@
               <a:pPr>
                 <a:defRPr/>
               </a:pPr>
-              <a:t>03/06/2015</a:t>
+              <a:t>04/06/2015</a:t>
             </a:fld>
             <a:endParaRPr lang="pt-BR" dirty="0"/>
           </a:p>
@@ -5619,7 +5619,7 @@
               <a:pPr>
                 <a:defRPr/>
               </a:pPr>
-              <a:t>03/06/2015</a:t>
+              <a:t>04/06/2015</a:t>
             </a:fld>
             <a:endParaRPr lang="pt-BR" dirty="0"/>
           </a:p>
@@ -6417,7 +6417,7 @@
                   <a:spcPct val="0"/>
                 </a:spcAft>
               </a:pPr>
-              <a:t>03/06/2015</a:t>
+              <a:t>04/06/2015</a:t>
             </a:fld>
             <a:endParaRPr lang="pt-BR"/>
           </a:p>
@@ -6990,7 +6990,7 @@
                   <a:spcPct val="0"/>
                 </a:spcAft>
               </a:pPr>
-              <a:t>03/06/2015</a:t>
+              <a:t>04/06/2015</a:t>
             </a:fld>
             <a:endParaRPr lang="pt-BR"/>
           </a:p>
@@ -7629,7 +7629,7 @@
                   <a:spcPct val="0"/>
                 </a:spcAft>
               </a:pPr>
-              <a:t>03/06/2015</a:t>
+              <a:t>04/06/2015</a:t>
             </a:fld>
             <a:endParaRPr lang="pt-BR"/>
           </a:p>
@@ -8526,7 +8526,7 @@
                   <a:spcPct val="0"/>
                 </a:spcAft>
               </a:pPr>
-              <a:t>03/06/2015</a:t>
+              <a:t>04/06/2015</a:t>
             </a:fld>
             <a:endParaRPr lang="pt-BR"/>
           </a:p>
@@ -9281,7 +9281,7 @@
               <a:pPr>
                 <a:defRPr/>
               </a:pPr>
-              <a:t>03/06/2015</a:t>
+              <a:t>04/06/2015</a:t>
             </a:fld>
             <a:endParaRPr lang="pt-BR" dirty="0"/>
           </a:p>
@@ -9663,7 +9663,7 @@
                   <a:spcPct val="0"/>
                 </a:spcAft>
               </a:pPr>
-              <a:t>03/06/2015</a:t>
+              <a:t>04/06/2015</a:t>
             </a:fld>
             <a:endParaRPr lang="pt-BR"/>
           </a:p>
@@ -9966,7 +9966,7 @@
                   <a:spcPct val="0"/>
                 </a:spcAft>
               </a:pPr>
-              <a:t>03/06/2015</a:t>
+              <a:t>04/06/2015</a:t>
             </a:fld>
             <a:endParaRPr lang="pt-BR"/>
           </a:p>
@@ -10509,7 +10509,7 @@
                   <a:spcPct val="0"/>
                 </a:spcAft>
               </a:pPr>
-              <a:t>03/06/2015</a:t>
+              <a:t>04/06/2015</a:t>
             </a:fld>
             <a:endParaRPr lang="pt-BR"/>
           </a:p>
@@ -11125,7 +11125,7 @@
                   <a:spcPct val="0"/>
                 </a:spcAft>
               </a:pPr>
-              <a:t>03/06/2015</a:t>
+              <a:t>04/06/2015</a:t>
             </a:fld>
             <a:endParaRPr lang="pt-BR"/>
           </a:p>
@@ -11707,7 +11707,7 @@
                   <a:spcPct val="0"/>
                 </a:spcAft>
               </a:pPr>
-              <a:t>03/06/2015</a:t>
+              <a:t>04/06/2015</a:t>
             </a:fld>
             <a:endParaRPr lang="pt-BR"/>
           </a:p>
@@ -13117,7 +13117,7 @@
                   <a:spcPct val="0"/>
                 </a:spcAft>
               </a:pPr>
-              <a:t>03/06/2015</a:t>
+              <a:t>04/06/2015</a:t>
             </a:fld>
             <a:endParaRPr lang="pt-BR"/>
           </a:p>
@@ -13771,7 +13771,7 @@
                   <a:spcPct val="0"/>
                 </a:spcAft>
               </a:pPr>
-              <a:t>03/06/2015</a:t>
+              <a:t>04/06/2015</a:t>
             </a:fld>
             <a:endParaRPr lang="pt-BR"/>
           </a:p>
@@ -14207,55 +14207,127 @@
               <a:rPr lang="pt-BR" sz="2800" dirty="0">
                 <a:latin typeface="Calibri" pitchFamily="34" charset="0"/>
               </a:rPr>
-              <a:t>Os testes foram satisfatórios, com trinta e </a:t>
+              <a:t>Os testes foram satisfatórios, </a:t>
             </a:r>
             <a:r>
               <a:rPr lang="pt-BR" sz="2800" dirty="0" smtClean="0">
                 <a:latin typeface="Calibri" pitchFamily="34" charset="0"/>
               </a:rPr>
-              <a:t>dois(   ) </a:t>
+              <a:t>em Vinte e cinco(  25 </a:t>
+            </a:r>
+            <a:r>
+              <a:rPr lang="pt-BR" sz="2800" dirty="0" smtClean="0">
+                <a:latin typeface="Calibri" pitchFamily="34" charset="0"/>
+              </a:rPr>
+              <a:t>) </a:t>
             </a:r>
             <a:r>
               <a:rPr lang="pt-BR" sz="2800" dirty="0">
                 <a:latin typeface="Calibri" pitchFamily="34" charset="0"/>
               </a:rPr>
-              <a:t>casos de testes, sendo vinte e </a:t>
+              <a:t>casos de testes, </a:t>
+            </a:r>
+            <a:r>
+              <a:rPr lang="pt-BR" sz="2800">
+                <a:latin typeface="Calibri" pitchFamily="34" charset="0"/>
+              </a:rPr>
+              <a:t>sendo </a:t>
+            </a:r>
+            <a:r>
+              <a:rPr lang="pt-BR" sz="2800" dirty="0">
+                <a:latin typeface="Calibri" pitchFamily="34" charset="0"/>
+              </a:rPr>
+              <a:t>q</a:t>
+            </a:r>
+            <a:r>
+              <a:rPr lang="pt-BR" sz="2800" smtClean="0">
+                <a:latin typeface="Calibri" pitchFamily="34" charset="0"/>
+              </a:rPr>
+              <a:t>uinze</a:t>
             </a:r>
             <a:r>
               <a:rPr lang="pt-BR" sz="2800" dirty="0" smtClean="0">
                 <a:latin typeface="Calibri" pitchFamily="34" charset="0"/>
               </a:rPr>
-              <a:t>um(  ) </a:t>
+              <a:t>( 15) </a:t>
             </a:r>
             <a:r>
               <a:rPr lang="pt-BR" sz="2800" dirty="0">
                 <a:latin typeface="Calibri" pitchFamily="34" charset="0"/>
               </a:rPr>
-              <a:t>testes com sucesso </a:t>
+              <a:t>testes com </a:t>
             </a:r>
             <a:r>
               <a:rPr lang="pt-BR" sz="2800" dirty="0" smtClean="0">
                 <a:latin typeface="Calibri" pitchFamily="34" charset="0"/>
               </a:rPr>
-              <a:t>onze(   ) </a:t>
+              <a:t>sucesso</a:t>
+            </a:r>
+            <a:r>
+              <a:rPr lang="pt-BR" sz="2800" smtClean="0">
+                <a:latin typeface="Calibri" pitchFamily="34" charset="0"/>
+              </a:rPr>
+              <a:t>, dez( 10 </a:t>
+            </a:r>
+            <a:r>
+              <a:rPr lang="pt-BR" sz="2800" dirty="0" smtClean="0">
+                <a:latin typeface="Calibri" pitchFamily="34" charset="0"/>
+              </a:rPr>
+              <a:t>) </a:t>
             </a:r>
             <a:r>
               <a:rPr lang="pt-BR" sz="2800" dirty="0">
                 <a:latin typeface="Calibri" pitchFamily="34" charset="0"/>
               </a:rPr>
-              <a:t>com falha e quatro</a:t>
+              <a:t>com falha </a:t>
+            </a:r>
+            <a:r>
+              <a:rPr lang="pt-BR" sz="2800">
+                <a:latin typeface="Calibri" pitchFamily="34" charset="0"/>
+              </a:rPr>
+              <a:t>e </a:t>
+            </a:r>
+            <a:r>
+              <a:rPr lang="pt-BR" sz="2800" dirty="0">
+                <a:latin typeface="Calibri" pitchFamily="34" charset="0"/>
+              </a:rPr>
+              <a:t>c</a:t>
+            </a:r>
+            <a:r>
+              <a:rPr lang="pt-BR" sz="2800" smtClean="0">
+                <a:latin typeface="Calibri" pitchFamily="34" charset="0"/>
+              </a:rPr>
+              <a:t>inco</a:t>
             </a:r>
             <a:r>
               <a:rPr lang="pt-BR" sz="2800" dirty="0" smtClean="0">
                 <a:latin typeface="Calibri" pitchFamily="34" charset="0"/>
               </a:rPr>
-              <a:t>(   ) </a:t>
+              <a:t>( 5  </a:t>
+            </a:r>
+            <a:r>
+              <a:rPr lang="pt-BR" sz="2800" dirty="0" smtClean="0">
+                <a:latin typeface="Calibri" pitchFamily="34" charset="0"/>
+              </a:rPr>
+              <a:t>) </a:t>
             </a:r>
             <a:r>
               <a:rPr lang="pt-BR" sz="2800" dirty="0">
                 <a:latin typeface="Calibri" pitchFamily="34" charset="0"/>
               </a:rPr>
-              <a:t>não foram executados, pois o jogo estava somente com a parte gerencial.</a:t>
+              <a:t>não foram executados, pois </a:t>
+            </a:r>
+            <a:r>
+              <a:rPr lang="pt-BR" sz="2800" dirty="0" smtClean="0">
+                <a:latin typeface="Calibri" pitchFamily="34" charset="0"/>
+              </a:rPr>
+              <a:t>o programa só estava </a:t>
+            </a:r>
+            <a:r>
+              <a:rPr lang="pt-BR" sz="2800" dirty="0">
+                <a:latin typeface="Calibri" pitchFamily="34" charset="0"/>
+              </a:rPr>
+              <a:t>somente com a parte gerencial.</a:t>
             </a:r>
           </a:p>
         </p:txBody>
@@ -14401,7 +14473,7 @@
                   <a:spcPct val="0"/>
                 </a:spcAft>
               </a:pPr>
-              <a:t>03/06/2015</a:t>
+              <a:t>04/06/2015</a:t>
             </a:fld>
             <a:endParaRPr lang="pt-BR"/>
           </a:p>
@@ -15180,7 +15252,7 @@
   <a:extraClrSchemeLst/>
   <a:extLst>
     <a:ext uri="{05A4C25C-085E-4340-85A3-A5531E510DB2}">
-      <thm15:themeFamily xmlns:thm15="http://schemas.microsoft.com/office/thememl/2012/main" xmlns="" name="Retrospect" id="{5F128B03-DCCA-4EEB-AB3B-CF2899314A46}" vid="{D26EA377-59BD-4C9C-9D94-EE8416EE4C79}"/>
+      <thm15:themeFamily xmlns="" xmlns:thm15="http://schemas.microsoft.com/office/thememl/2012/main" name="Retrospect" id="{5F128B03-DCCA-4EEB-AB3B-CF2899314A46}" vid="{D26EA377-59BD-4C9C-9D94-EE8416EE4C79}"/>
     </a:ext>
   </a:extLst>
 </a:theme>
@@ -15441,7 +15513,7 @@
   <a:extraClrSchemeLst/>
   <a:extLst>
     <a:ext uri="{05A4C25C-085E-4340-85A3-A5531E510DB2}">
-      <thm15:themeFamily xmlns:thm15="http://schemas.microsoft.com/office/thememl/2012/main" xmlns="" name="Office Theme" id="{62F939B6-93AF-4DB8-9C6B-D6C7DFDC589F}" vid="{4A3C46E8-61CC-4603-A589-7422A47A8E4A}"/>
+      <thm15:themeFamily xmlns="" xmlns:thm15="http://schemas.microsoft.com/office/thememl/2012/main" name="Office Theme" id="{62F939B6-93AF-4DB8-9C6B-D6C7DFDC589F}" vid="{4A3C46E8-61CC-4603-A589-7422A47A8E4A}"/>
     </a:ext>
   </a:extLst>
 </a:theme>

</xml_diff>